<commit_message>
Better handling of foreign keys + screen clearing added
</commit_message>
<xml_diff>
--- a/doc/schéma BDD.pptx
+++ b/doc/schéma BDD.pptx
@@ -307,7 +307,7 @@
             <a:fld id="{792B231A-10A6-4570-A5C3-F4B29653B4D4}" type="datetimeFigureOut">
               <a:rPr lang="fr-FR" smtClean="0"/>
               <a:pPr/>
-              <a:t>12/12/2017</a:t>
+              <a:t>14/12/2017</a:t>
             </a:fld>
             <a:endParaRPr lang="fr-FR"/>
           </a:p>
@@ -472,7 +472,7 @@
             <a:fld id="{792B231A-10A6-4570-A5C3-F4B29653B4D4}" type="datetimeFigureOut">
               <a:rPr lang="fr-FR" smtClean="0"/>
               <a:pPr/>
-              <a:t>12/12/2017</a:t>
+              <a:t>14/12/2017</a:t>
             </a:fld>
             <a:endParaRPr lang="fr-FR"/>
           </a:p>
@@ -647,7 +647,7 @@
             <a:fld id="{792B231A-10A6-4570-A5C3-F4B29653B4D4}" type="datetimeFigureOut">
               <a:rPr lang="fr-FR" smtClean="0"/>
               <a:pPr/>
-              <a:t>12/12/2017</a:t>
+              <a:t>14/12/2017</a:t>
             </a:fld>
             <a:endParaRPr lang="fr-FR"/>
           </a:p>
@@ -812,7 +812,7 @@
             <a:fld id="{792B231A-10A6-4570-A5C3-F4B29653B4D4}" type="datetimeFigureOut">
               <a:rPr lang="fr-FR" smtClean="0"/>
               <a:pPr/>
-              <a:t>12/12/2017</a:t>
+              <a:t>14/12/2017</a:t>
             </a:fld>
             <a:endParaRPr lang="fr-FR"/>
           </a:p>
@@ -1054,7 +1054,7 @@
             <a:fld id="{792B231A-10A6-4570-A5C3-F4B29653B4D4}" type="datetimeFigureOut">
               <a:rPr lang="fr-FR" smtClean="0"/>
               <a:pPr/>
-              <a:t>12/12/2017</a:t>
+              <a:t>14/12/2017</a:t>
             </a:fld>
             <a:endParaRPr lang="fr-FR"/>
           </a:p>
@@ -1336,7 +1336,7 @@
             <a:fld id="{792B231A-10A6-4570-A5C3-F4B29653B4D4}" type="datetimeFigureOut">
               <a:rPr lang="fr-FR" smtClean="0"/>
               <a:pPr/>
-              <a:t>12/12/2017</a:t>
+              <a:t>14/12/2017</a:t>
             </a:fld>
             <a:endParaRPr lang="fr-FR"/>
           </a:p>
@@ -1752,7 +1752,7 @@
             <a:fld id="{792B231A-10A6-4570-A5C3-F4B29653B4D4}" type="datetimeFigureOut">
               <a:rPr lang="fr-FR" smtClean="0"/>
               <a:pPr/>
-              <a:t>12/12/2017</a:t>
+              <a:t>14/12/2017</a:t>
             </a:fld>
             <a:endParaRPr lang="fr-FR"/>
           </a:p>
@@ -1866,7 +1866,7 @@
             <a:fld id="{792B231A-10A6-4570-A5C3-F4B29653B4D4}" type="datetimeFigureOut">
               <a:rPr lang="fr-FR" smtClean="0"/>
               <a:pPr/>
-              <a:t>12/12/2017</a:t>
+              <a:t>14/12/2017</a:t>
             </a:fld>
             <a:endParaRPr lang="fr-FR"/>
           </a:p>
@@ -1958,7 +1958,7 @@
             <a:fld id="{792B231A-10A6-4570-A5C3-F4B29653B4D4}" type="datetimeFigureOut">
               <a:rPr lang="fr-FR" smtClean="0"/>
               <a:pPr/>
-              <a:t>12/12/2017</a:t>
+              <a:t>14/12/2017</a:t>
             </a:fld>
             <a:endParaRPr lang="fr-FR"/>
           </a:p>
@@ -2230,7 +2230,7 @@
             <a:fld id="{792B231A-10A6-4570-A5C3-F4B29653B4D4}" type="datetimeFigureOut">
               <a:rPr lang="fr-FR" smtClean="0"/>
               <a:pPr/>
-              <a:t>12/12/2017</a:t>
+              <a:t>14/12/2017</a:t>
             </a:fld>
             <a:endParaRPr lang="fr-FR"/>
           </a:p>
@@ -2479,7 +2479,7 @@
             <a:fld id="{792B231A-10A6-4570-A5C3-F4B29653B4D4}" type="datetimeFigureOut">
               <a:rPr lang="fr-FR" smtClean="0"/>
               <a:pPr/>
-              <a:t>12/12/2017</a:t>
+              <a:t>14/12/2017</a:t>
             </a:fld>
             <a:endParaRPr lang="fr-FR"/>
           </a:p>
@@ -2687,7 +2687,7 @@
             <a:fld id="{792B231A-10A6-4570-A5C3-F4B29653B4D4}" type="datetimeFigureOut">
               <a:rPr lang="fr-FR" smtClean="0"/>
               <a:pPr/>
-              <a:t>12/12/2017</a:t>
+              <a:t>14/12/2017</a:t>
             </a:fld>
             <a:endParaRPr lang="fr-FR"/>
           </a:p>
@@ -3176,10 +3176,10 @@
           </a:p>
           <a:p>
             <a:r>
-              <a:rPr lang="fr-FR" b="1" u="sng" dirty="0" err="1"/>
+              <a:rPr lang="fr-FR" b="1" dirty="0" err="1"/>
               <a:t>CategoryName</a:t>
             </a:r>
-            <a:endParaRPr lang="fr-FR" b="1" u="sng" dirty="0"/>
+            <a:endParaRPr lang="fr-FR" b="1" dirty="0"/>
           </a:p>
         </p:txBody>
       </p:sp>
@@ -3192,7 +3192,7 @@
         <p:spPr>
           <a:xfrm>
             <a:off x="4716016" y="644495"/>
-            <a:ext cx="2099142" cy="2496474"/>
+            <a:ext cx="2099142" cy="2640488"/>
           </a:xfrm>
           <a:prstGeom prst="roundRect">
             <a:avLst>
@@ -3281,7 +3281,7 @@
         <p:spPr>
           <a:xfrm>
             <a:off x="5048736" y="1018473"/>
-            <a:ext cx="1872208" cy="2308324"/>
+            <a:ext cx="1872208" cy="2585323"/>
           </a:xfrm>
           <a:prstGeom prst="rect">
             <a:avLst/>
@@ -3302,9 +3302,16 @@
           <a:p>
             <a:r>
               <a:rPr lang="fr-FR" b="1" u="sng" dirty="0" err="1"/>
+              <a:t>CatNum</a:t>
+            </a:r>
+            <a:endParaRPr lang="fr-FR" b="1" u="sng" dirty="0"/>
+          </a:p>
+          <a:p>
+            <a:r>
+              <a:rPr lang="fr-FR" b="1" dirty="0" err="1"/>
               <a:t>ProductName</a:t>
             </a:r>
-            <a:endParaRPr lang="fr-FR" b="1" u="sng" dirty="0"/>
+            <a:endParaRPr lang="fr-FR" b="1" dirty="0"/>
           </a:p>
           <a:p>
             <a:r>
@@ -3315,7 +3322,7 @@
           </a:p>
           <a:p>
             <a:r>
-              <a:rPr lang="fr-FR" dirty="0"/>
+              <a:rPr lang="fr-FR" b="1" dirty="0"/>
               <a:t>Grade</a:t>
             </a:r>
           </a:p>
@@ -3327,8 +3334,8 @@
           </a:p>
           <a:p>
             <a:r>
-              <a:rPr lang="fr-FR" dirty="0" err="1"/>
-              <a:t>Purchase_places</a:t>
+              <a:rPr lang="fr-FR"/>
+              <a:t>PurchasePlaces</a:t>
             </a:r>
             <a:endParaRPr lang="fr-FR" dirty="0"/>
           </a:p>
@@ -3351,8 +3358,8 @@
         </p:nvSpPr>
         <p:spPr>
           <a:xfrm>
-            <a:off x="3275856" y="3501008"/>
-            <a:ext cx="2179879" cy="2880320"/>
+            <a:off x="3275856" y="3501007"/>
+            <a:ext cx="2179879" cy="2585323"/>
           </a:xfrm>
           <a:prstGeom prst="roundRect">
             <a:avLst>
@@ -3439,8 +3446,8 @@
         </p:nvSpPr>
         <p:spPr>
           <a:xfrm>
-            <a:off x="3563888" y="4077072"/>
-            <a:ext cx="1944216" cy="3139321"/>
+            <a:off x="3554215" y="4056397"/>
+            <a:ext cx="1944216" cy="2862322"/>
           </a:xfrm>
           <a:prstGeom prst="rect">
             <a:avLst/>
@@ -3460,21 +3467,8 @@
           </a:p>
           <a:p>
             <a:r>
-              <a:rPr lang="fr-FR" dirty="0" err="1"/>
+              <a:rPr lang="fr-FR" b="1" dirty="0" err="1"/>
               <a:t>SubName</a:t>
-            </a:r>
-            <a:endParaRPr lang="fr-FR" dirty="0"/>
-          </a:p>
-          <a:p>
-            <a:r>
-              <a:rPr lang="fr-FR" dirty="0"/>
-              <a:t>Description</a:t>
-            </a:r>
-          </a:p>
-          <a:p>
-            <a:r>
-              <a:rPr lang="fr-FR" b="1" dirty="0" err="1"/>
-              <a:t>CategoryName</a:t>
             </a:r>
             <a:endParaRPr lang="fr-FR" b="1" dirty="0"/>
           </a:p>
@@ -3482,6 +3476,13 @@
             <a:r>
               <a:rPr lang="fr-FR" b="1" dirty="0" err="1"/>
               <a:t>ProductName</a:t>
+            </a:r>
+            <a:endParaRPr lang="fr-FR" b="1" dirty="0"/>
+          </a:p>
+          <a:p>
+            <a:r>
+              <a:rPr lang="fr-FR" b="1" dirty="0" err="1"/>
+              <a:t>ProdNum</a:t>
             </a:r>
             <a:endParaRPr lang="fr-FR" b="1" dirty="0"/>
           </a:p>
@@ -3558,7 +3559,7 @@
         </p:blipFill>
         <p:spPr bwMode="auto">
           <a:xfrm>
-            <a:off x="4860032" y="1364575"/>
+            <a:off x="4807156" y="1423589"/>
             <a:ext cx="297707" cy="144016"/>
           </a:xfrm>
           <a:prstGeom prst="rect">
@@ -3584,7 +3585,7 @@
         </p:blipFill>
         <p:spPr bwMode="auto">
           <a:xfrm>
-            <a:off x="3347864" y="4221088"/>
+            <a:off x="3297204" y="4147338"/>
             <a:ext cx="297707" cy="144016"/>
           </a:xfrm>
           <a:prstGeom prst="rect">
@@ -3638,8 +3639,8 @@
         </p:nvCxnSpPr>
         <p:spPr>
           <a:xfrm rot="16200000" flipH="1">
-            <a:off x="1208353" y="2873665"/>
-            <a:ext cx="2736304" cy="1398701"/>
+            <a:off x="1282103" y="2799915"/>
+            <a:ext cx="2588805" cy="1398701"/>
           </a:xfrm>
           <a:prstGeom prst="bentConnector2">
             <a:avLst/>
@@ -3790,8 +3791,8 @@
         </p:nvCxnSpPr>
         <p:spPr>
           <a:xfrm rot="5400000">
-            <a:off x="5085879" y="3510827"/>
-            <a:ext cx="1800198" cy="1060485"/>
+            <a:off x="5241452" y="3499266"/>
+            <a:ext cx="1508686" cy="1080120"/>
           </a:xfrm>
           <a:prstGeom prst="bentConnector2">
             <a:avLst/>
@@ -3823,7 +3824,7 @@
         </p:nvSpPr>
         <p:spPr>
           <a:xfrm>
-            <a:off x="5796136" y="3140968"/>
+            <a:off x="5862734" y="3259724"/>
             <a:ext cx="648072" cy="369332"/>
           </a:xfrm>
           <a:prstGeom prst="rect">
@@ -3873,6 +3874,70 @@
           </a:p>
         </p:txBody>
       </p:sp>
+      <p:pic>
+        <p:nvPicPr>
+          <p:cNvPr id="27" name="Picture 2" descr="C:\Users\Foot\AppData\Local\Microsoft\Windows\Temporary Internet Files\Content.IE5\N63LF4SM\Key-yellow[1].png">
+            <a:extLst>
+              <a:ext uri="{FF2B5EF4-FFF2-40B4-BE49-F238E27FC236}">
+                <a16:creationId xmlns:a16="http://schemas.microsoft.com/office/drawing/2014/main" id="{9FD64E1D-66C5-4739-A774-225F072B66A3}"/>
+              </a:ext>
+            </a:extLst>
+          </p:cNvPr>
+          <p:cNvPicPr>
+            <a:picLocks noChangeAspect="1" noChangeArrowheads="1"/>
+          </p:cNvPicPr>
+          <p:nvPr/>
+        </p:nvPicPr>
+        <p:blipFill>
+          <a:blip r:embed="rId2" cstate="print"/>
+          <a:srcRect/>
+          <a:stretch>
+            <a:fillRect/>
+          </a:stretch>
+        </p:blipFill>
+        <p:spPr bwMode="auto">
+          <a:xfrm>
+            <a:off x="3323680" y="4972818"/>
+            <a:ext cx="297707" cy="144016"/>
+          </a:xfrm>
+          <a:prstGeom prst="rect">
+            <a:avLst/>
+          </a:prstGeom>
+          <a:noFill/>
+        </p:spPr>
+      </p:pic>
+      <p:pic>
+        <p:nvPicPr>
+          <p:cNvPr id="30" name="Picture 2" descr="C:\Users\Foot\AppData\Local\Microsoft\Windows\Temporary Internet Files\Content.IE5\N63LF4SM\Key-yellow[1].png">
+            <a:extLst>
+              <a:ext uri="{FF2B5EF4-FFF2-40B4-BE49-F238E27FC236}">
+                <a16:creationId xmlns:a16="http://schemas.microsoft.com/office/drawing/2014/main" id="{44CE7779-4F98-45B9-9739-D9EDEE0A0C1F}"/>
+              </a:ext>
+            </a:extLst>
+          </p:cNvPr>
+          <p:cNvPicPr>
+            <a:picLocks noChangeAspect="1" noChangeArrowheads="1"/>
+          </p:cNvPicPr>
+          <p:nvPr/>
+        </p:nvPicPr>
+        <p:blipFill>
+          <a:blip r:embed="rId2" cstate="print"/>
+          <a:srcRect/>
+          <a:stretch>
+            <a:fillRect/>
+          </a:stretch>
+        </p:blipFill>
+        <p:spPr bwMode="auto">
+          <a:xfrm>
+            <a:off x="4788024" y="1124745"/>
+            <a:ext cx="297707" cy="144016"/>
+          </a:xfrm>
+          <a:prstGeom prst="rect">
+            <a:avLst/>
+          </a:prstGeom>
+          <a:noFill/>
+        </p:spPr>
+      </p:pic>
     </p:spTree>
   </p:cSld>
   <p:clrMapOvr>

</xml_diff>